<commit_message>
Updating slides to include Pebble Time
</commit_message>
<xml_diff>
--- a/slides/Pebble JS Dev.pptx
+++ b/slides/Pebble JS Dev.pptx
@@ -5,7 +5,7 @@
     <p:sldMasterId id="2147483648" r:id="rId1"/>
   </p:sldMasterIdLst>
   <p:notesMasterIdLst>
-    <p:notesMasterId r:id="rId12"/>
+    <p:notesMasterId r:id="rId13"/>
   </p:notesMasterIdLst>
   <p:sldIdLst>
     <p:sldId id="256" r:id="rId2"/>
@@ -16,8 +16,9 @@
     <p:sldId id="262" r:id="rId7"/>
     <p:sldId id="263" r:id="rId8"/>
     <p:sldId id="266" r:id="rId9"/>
-    <p:sldId id="264" r:id="rId10"/>
-    <p:sldId id="265" r:id="rId11"/>
+    <p:sldId id="267" r:id="rId10"/>
+    <p:sldId id="264" r:id="rId11"/>
+    <p:sldId id="265" r:id="rId12"/>
   </p:sldIdLst>
   <p:sldSz cx="12192000" cy="6858000"/>
   <p:notesSz cx="6858000" cy="9144000"/>
@@ -6613,6 +6614,13 @@
   <p:clrMapOvr>
     <a:masterClrMapping/>
   </p:clrMapOvr>
+  <p:timing>
+    <p:tnLst>
+      <p:par>
+        <p:cTn id="1" dur="indefinite" restart="never" nodeType="tmRoot"/>
+      </p:par>
+    </p:tnLst>
+  </p:timing>
 </p:sld>
 </file>
 
@@ -6650,6 +6658,203 @@
           <a:p>
             <a:r>
               <a:rPr lang="en-US" dirty="0" smtClean="0"/>
+              <a:t>Lets View some Code</a:t>
+            </a:r>
+            <a:endParaRPr lang="en-US" dirty="0"/>
+          </a:p>
+        </p:txBody>
+      </p:sp>
+      <p:sp>
+        <p:nvSpPr>
+          <p:cNvPr id="3" name="Content Placeholder 2"/>
+          <p:cNvSpPr>
+            <a:spLocks noGrp="1"/>
+          </p:cNvSpPr>
+          <p:nvPr>
+            <p:ph idx="1"/>
+          </p:nvPr>
+        </p:nvSpPr>
+        <p:spPr>
+          <a:xfrm>
+            <a:off x="1104293" y="1500983"/>
+            <a:ext cx="8946541" cy="4195481"/>
+          </a:xfrm>
+        </p:spPr>
+        <p:txBody>
+          <a:bodyPr>
+            <a:normAutofit fontScale="92500" lnSpcReduction="20000"/>
+          </a:bodyPr>
+          <a:lstStyle/>
+          <a:p>
+            <a:r>
+              <a:rPr lang="en-US" dirty="0" smtClean="0"/>
+              <a:t>File System Development</a:t>
+            </a:r>
+          </a:p>
+          <a:p>
+            <a:pPr lvl="1"/>
+            <a:r>
+              <a:rPr lang="en-US" dirty="0" err="1" smtClean="0"/>
+              <a:t>Appinfo.json</a:t>
+            </a:r>
+            <a:r>
+              <a:rPr lang="en-US" dirty="0" smtClean="0"/>
+              <a:t> :  capabilities: [“configurable”]</a:t>
+            </a:r>
+          </a:p>
+          <a:p>
+            <a:pPr lvl="2"/>
+            <a:r>
+              <a:rPr lang="en-US" dirty="0" smtClean="0"/>
+              <a:t>Under settings in Cloud Pebble</a:t>
+            </a:r>
+          </a:p>
+          <a:p>
+            <a:pPr lvl="1"/>
+            <a:r>
+              <a:rPr lang="en-US" dirty="0" smtClean="0"/>
+              <a:t>js/pebble-js-app.js</a:t>
+            </a:r>
+          </a:p>
+          <a:p>
+            <a:pPr lvl="2"/>
+            <a:r>
+              <a:rPr lang="en-US" dirty="0" smtClean="0"/>
+              <a:t>File automatically loaded by Pebble for the app</a:t>
+            </a:r>
+          </a:p>
+          <a:p>
+            <a:pPr lvl="1"/>
+            <a:r>
+              <a:rPr lang="en-US" dirty="0" smtClean="0"/>
+              <a:t>Add your application to the store</a:t>
+            </a:r>
+          </a:p>
+          <a:p>
+            <a:pPr lvl="2"/>
+            <a:r>
+              <a:rPr lang="en-US" dirty="0">
+                <a:hlinkClick r:id="rId2"/>
+              </a:rPr>
+              <a:t>https://</a:t>
+            </a:r>
+            <a:r>
+              <a:rPr lang="en-US" dirty="0" smtClean="0">
+                <a:hlinkClick r:id="rId2"/>
+              </a:rPr>
+              <a:t>dev-portal.getpebble.com</a:t>
+            </a:r>
+            <a:endParaRPr lang="en-US" dirty="0" smtClean="0"/>
+          </a:p>
+          <a:p>
+            <a:r>
+              <a:rPr lang="en-US" dirty="0" smtClean="0"/>
+              <a:t>Cloud Pebble Development</a:t>
+            </a:r>
+          </a:p>
+          <a:p>
+            <a:pPr lvl="1"/>
+            <a:r>
+              <a:rPr lang="en-US" dirty="0" smtClean="0">
+                <a:hlinkClick r:id="rId3"/>
+              </a:rPr>
+              <a:t>Cloud Pebble Development</a:t>
+            </a:r>
+            <a:endParaRPr lang="en-US" dirty="0" smtClean="0"/>
+          </a:p>
+          <a:p>
+            <a:pPr lvl="1"/>
+            <a:r>
+              <a:rPr lang="en-US" dirty="0" smtClean="0"/>
+              <a:t>“ready” = JavaScript handler is ready</a:t>
+            </a:r>
+          </a:p>
+          <a:p>
+            <a:pPr lvl="1"/>
+            <a:r>
+              <a:rPr lang="en-US" dirty="0" smtClean="0"/>
+              <a:t>“</a:t>
+            </a:r>
+            <a:r>
+              <a:rPr lang="en-US" dirty="0" err="1" smtClean="0"/>
+              <a:t>appmessage</a:t>
+            </a:r>
+            <a:r>
+              <a:rPr lang="en-US" dirty="0" smtClean="0"/>
+              <a:t>” = when you have received a message from phone</a:t>
+            </a:r>
+          </a:p>
+          <a:p>
+            <a:pPr lvl="2"/>
+            <a:r>
+              <a:rPr lang="en-US" dirty="0" err="1" smtClean="0"/>
+              <a:t>Pebble.sendAppMessage</a:t>
+            </a:r>
+            <a:r>
+              <a:rPr lang="en-US" dirty="0" smtClean="0"/>
+              <a:t>(message) – to send to phone</a:t>
+            </a:r>
+          </a:p>
+          <a:p>
+            <a:pPr lvl="1"/>
+            <a:endParaRPr lang="en-US" dirty="0"/>
+          </a:p>
+        </p:txBody>
+      </p:sp>
+    </p:spTree>
+    <p:extLst>
+      <p:ext uri="{BB962C8B-B14F-4D97-AF65-F5344CB8AC3E}">
+        <p14:creationId xmlns:p14="http://schemas.microsoft.com/office/powerpoint/2010/main" val="358192862"/>
+      </p:ext>
+    </p:extLst>
+  </p:cSld>
+  <p:clrMapOvr>
+    <a:masterClrMapping/>
+  </p:clrMapOvr>
+  <p:timing>
+    <p:tnLst>
+      <p:par>
+        <p:cTn id="1" dur="indefinite" restart="never" nodeType="tmRoot"/>
+      </p:par>
+    </p:tnLst>
+  </p:timing>
+</p:sld>
+</file>
+
+<file path=ppt/slides/slide11.xml><?xml version="1.0" encoding="utf-8"?>
+<p:sld xmlns:a="http://schemas.openxmlformats.org/drawingml/2006/main" xmlns:r="http://schemas.openxmlformats.org/officeDocument/2006/relationships" xmlns:p="http://schemas.openxmlformats.org/presentationml/2006/main">
+  <p:cSld>
+    <p:spTree>
+      <p:nvGrpSpPr>
+        <p:cNvPr id="1" name=""/>
+        <p:cNvGrpSpPr/>
+        <p:nvPr/>
+      </p:nvGrpSpPr>
+      <p:grpSpPr>
+        <a:xfrm>
+          <a:off x="0" y="0"/>
+          <a:ext cx="0" cy="0"/>
+          <a:chOff x="0" y="0"/>
+          <a:chExt cx="0" cy="0"/>
+        </a:xfrm>
+      </p:grpSpPr>
+      <p:sp>
+        <p:nvSpPr>
+          <p:cNvPr id="2" name="Title 1"/>
+          <p:cNvSpPr>
+            <a:spLocks noGrp="1"/>
+          </p:cNvSpPr>
+          <p:nvPr>
+            <p:ph type="title"/>
+          </p:nvPr>
+        </p:nvSpPr>
+        <p:spPr/>
+        <p:txBody>
+          <a:bodyPr/>
+          <a:lstStyle/>
+          <a:p>
+            <a:r>
+              <a:rPr lang="en-US" dirty="0" smtClean="0"/>
               <a:t>Resources</a:t>
             </a:r>
             <a:endParaRPr lang="en-US" dirty="0"/>
@@ -6797,6 +7002,13 @@
   <p:clrMapOvr>
     <a:masterClrMapping/>
   </p:clrMapOvr>
+  <p:timing>
+    <p:tnLst>
+      <p:par>
+        <p:cTn id="1" dur="indefinite" restart="never" nodeType="tmRoot"/>
+      </p:par>
+    </p:tnLst>
+  </p:timing>
 </p:sld>
 </file>
 
@@ -7634,19 +7846,13 @@
               <a:rPr lang="en-US" dirty="0" smtClean="0"/>
               <a:t>JavaScript</a:t>
             </a:r>
-            <a:endParaRPr lang="en-US" dirty="0" smtClean="0"/>
           </a:p>
           <a:p>
             <a:pPr lvl="1"/>
             <a:r>
               <a:rPr lang="en-US" dirty="0" smtClean="0"/>
-              <a:t>HTML concepts (DIV</a:t>
-            </a:r>
-            <a:r>
-              <a:rPr lang="en-US" dirty="0" smtClean="0"/>
-              <a:t>, CSS Styling, etc.)</a:t>
-            </a:r>
-            <a:endParaRPr lang="en-US" dirty="0" smtClean="0"/>
+              <a:t>HTML concepts (DIV, CSS Styling, etc.)</a:t>
+            </a:r>
           </a:p>
           <a:p>
             <a:r>
@@ -7658,11 +7864,7 @@
             <a:pPr lvl="1"/>
             <a:r>
               <a:rPr lang="en-US" dirty="0" smtClean="0"/>
-              <a:t>Wearables (Pebble, Samsung Gear, </a:t>
-            </a:r>
-            <a:r>
-              <a:rPr lang="en-US" dirty="0" smtClean="0"/>
-              <a:t>LG Watches, </a:t>
+              <a:t>Wearables (Pebble, Samsung Gear, LG Watches, </a:t>
             </a:r>
             <a:r>
               <a:rPr lang="en-US" dirty="0" err="1" smtClean="0"/>
@@ -7684,11 +7886,7 @@
             <a:pPr lvl="1"/>
             <a:r>
               <a:rPr lang="en-US" dirty="0" smtClean="0"/>
-              <a:t>Using Third Party </a:t>
-            </a:r>
-            <a:r>
-              <a:rPr lang="en-US" dirty="0" smtClean="0"/>
-              <a:t>libraries</a:t>
+              <a:t>Using Third Party libraries</a:t>
             </a:r>
           </a:p>
           <a:p>
@@ -8465,11 +8663,7 @@
             </a:r>
             <a:r>
               <a:rPr lang="en-US" dirty="0" smtClean="0"/>
-              <a:t> </a:t>
-            </a:r>
-            <a:r>
-              <a:rPr lang="en-US" dirty="0" smtClean="0"/>
-              <a:t>team joins Pebble</a:t>
+              <a:t> team joins Pebble</a:t>
             </a:r>
           </a:p>
           <a:p>
@@ -8498,6 +8692,13 @@
   <p:clrMapOvr>
     <a:masterClrMapping/>
   </p:clrMapOvr>
+  <p:timing>
+    <p:tnLst>
+      <p:par>
+        <p:cTn id="1" dur="indefinite" restart="never" nodeType="tmRoot"/>
+      </p:par>
+    </p:tnLst>
+  </p:timing>
 </p:sld>
 </file>
 
@@ -8777,6 +8978,13 @@
   <p:clrMapOvr>
     <a:masterClrMapping/>
   </p:clrMapOvr>
+  <p:timing>
+    <p:tnLst>
+      <p:par>
+        <p:cTn id="1" dur="indefinite" restart="never" nodeType="tmRoot"/>
+      </p:par>
+    </p:tnLst>
+  </p:timing>
 </p:sld>
 </file>
 
@@ -9055,6 +9263,13 @@
   <p:clrMapOvr>
     <a:masterClrMapping/>
   </p:clrMapOvr>
+  <p:timing>
+    <p:tnLst>
+      <p:par>
+        <p:cTn id="1" dur="indefinite" restart="never" nodeType="tmRoot"/>
+      </p:par>
+    </p:tnLst>
+  </p:timing>
 </p:sld>
 </file>
 
@@ -9204,6 +9419,13 @@
   <p:clrMapOvr>
     <a:masterClrMapping/>
   </p:clrMapOvr>
+  <p:timing>
+    <p:tnLst>
+      <p:par>
+        <p:cTn id="1" dur="indefinite" restart="never" nodeType="tmRoot"/>
+      </p:par>
+    </p:tnLst>
+  </p:timing>
 </p:sld>
 </file>
 
@@ -9760,6 +9982,13 @@
   <p:clrMapOvr>
     <a:masterClrMapping/>
   </p:clrMapOvr>
+  <p:timing>
+    <p:tnLst>
+      <p:par>
+        <p:cTn id="1" dur="indefinite" restart="never" nodeType="tmRoot"/>
+      </p:par>
+    </p:tnLst>
+  </p:timing>
 </p:sld>
 </file>
 
@@ -9790,166 +10019,206 @@
             <p:ph type="title"/>
           </p:nvPr>
         </p:nvSpPr>
-        <p:spPr/>
+        <p:spPr>
+          <a:xfrm>
+            <a:off x="646111" y="452718"/>
+            <a:ext cx="9404723" cy="773409"/>
+          </a:xfrm>
+        </p:spPr>
         <p:txBody>
           <a:bodyPr/>
           <a:lstStyle/>
           <a:p>
             <a:r>
               <a:rPr lang="en-US" dirty="0" smtClean="0"/>
-              <a:t>Lets View some Code</a:t>
+              <a:t>Pebble Time</a:t>
             </a:r>
             <a:endParaRPr lang="en-US" dirty="0"/>
           </a:p>
         </p:txBody>
       </p:sp>
-      <p:sp>
-        <p:nvSpPr>
-          <p:cNvPr id="3" name="Content Placeholder 2"/>
-          <p:cNvSpPr>
-            <a:spLocks noGrp="1"/>
-          </p:cNvSpPr>
-          <p:nvPr>
-            <p:ph idx="1"/>
-          </p:nvPr>
-        </p:nvSpPr>
+      <p:pic>
+        <p:nvPicPr>
+          <p:cNvPr id="4" name="Picture 3"/>
+          <p:cNvPicPr>
+            <a:picLocks noChangeAspect="1"/>
+          </p:cNvPicPr>
+          <p:nvPr/>
+        </p:nvPicPr>
+        <p:blipFill>
+          <a:blip r:embed="rId2">
+            <a:extLst>
+              <a:ext uri="{28A0092B-C50C-407E-A947-70E740481C1C}">
+                <a14:useLocalDpi xmlns:a14="http://schemas.microsoft.com/office/drawing/2010/main" val="0"/>
+              </a:ext>
+            </a:extLst>
+          </a:blip>
+          <a:stretch>
+            <a:fillRect/>
+          </a:stretch>
+        </p:blipFill>
         <p:spPr>
           <a:xfrm>
-            <a:off x="1104293" y="1500983"/>
-            <a:ext cx="8946541" cy="4195481"/>
+            <a:off x="4487142" y="1626829"/>
+            <a:ext cx="6953642" cy="3953641"/>
           </a:xfrm>
+          <a:prstGeom prst="rect">
+            <a:avLst/>
+          </a:prstGeom>
+          <a:ln>
+            <a:noFill/>
+          </a:ln>
+          <a:effectLst>
+            <a:outerShdw blurRad="127000" dist="38100" dir="2700000" algn="ctr">
+              <a:srgbClr val="000000">
+                <a:alpha val="45000"/>
+              </a:srgbClr>
+            </a:outerShdw>
+          </a:effectLst>
+          <a:scene3d>
+            <a:camera prst="perspectiveFront" fov="2700000">
+              <a:rot lat="20376000" lon="1938000" rev="20112001"/>
+            </a:camera>
+            <a:lightRig rig="soft" dir="t">
+              <a:rot lat="0" lon="0" rev="0"/>
+            </a:lightRig>
+          </a:scene3d>
+          <a:sp3d prstMaterial="translucentPowder">
+            <a:bevelT w="203200" h="50800" prst="softRound"/>
+          </a:sp3d>
         </p:spPr>
-        <p:txBody>
-          <a:bodyPr>
-            <a:normAutofit fontScale="92500" lnSpcReduction="20000"/>
+      </p:pic>
+      <p:sp>
+        <p:nvSpPr>
+          <p:cNvPr id="5" name="TextBox 4"/>
+          <p:cNvSpPr txBox="1"/>
+          <p:nvPr/>
+        </p:nvSpPr>
+        <p:spPr>
+          <a:xfrm>
+            <a:off x="220084" y="2172488"/>
+            <a:ext cx="4397358" cy="2862322"/>
+          </a:xfrm>
+          <a:prstGeom prst="rect">
+            <a:avLst/>
+          </a:prstGeom>
+          <a:noFill/>
+        </p:spPr>
+        <p:txBody>
+          <a:bodyPr wrap="none" rtlCol="0">
+            <a:spAutoFit/>
           </a:bodyPr>
           <a:lstStyle/>
           <a:p>
-            <a:r>
-              <a:rPr lang="en-US" dirty="0" smtClean="0"/>
-              <a:t>File System Development</a:t>
-            </a:r>
-          </a:p>
-          <a:p>
-            <a:pPr lvl="1"/>
-            <a:r>
-              <a:rPr lang="en-US" dirty="0" err="1" smtClean="0"/>
-              <a:t>Appinfo.json</a:t>
-            </a:r>
-            <a:r>
-              <a:rPr lang="en-US" dirty="0" smtClean="0"/>
-              <a:t> :  capabilities: [“configurable”]</a:t>
-            </a:r>
-          </a:p>
-          <a:p>
-            <a:pPr lvl="2"/>
-            <a:r>
-              <a:rPr lang="en-US" dirty="0" smtClean="0"/>
-              <a:t>Under settings in Cloud Pebble</a:t>
-            </a:r>
-          </a:p>
-          <a:p>
-            <a:pPr lvl="1"/>
-            <a:r>
-              <a:rPr lang="en-US" dirty="0" smtClean="0"/>
-              <a:t>js/pebble-js-app.js</a:t>
-            </a:r>
-          </a:p>
-          <a:p>
-            <a:pPr lvl="2"/>
-            <a:r>
-              <a:rPr lang="en-US" dirty="0" smtClean="0"/>
-              <a:t>File automatically loaded by Pebble for the app</a:t>
-            </a:r>
-          </a:p>
-          <a:p>
-            <a:pPr lvl="1"/>
-            <a:r>
-              <a:rPr lang="en-US" dirty="0" smtClean="0"/>
-              <a:t>Add your application to the store</a:t>
-            </a:r>
-          </a:p>
-          <a:p>
-            <a:pPr lvl="2"/>
-            <a:r>
-              <a:rPr lang="en-US" dirty="0">
-                <a:hlinkClick r:id="rId2"/>
-              </a:rPr>
-              <a:t>https://</a:t>
-            </a:r>
-            <a:r>
-              <a:rPr lang="en-US" dirty="0" smtClean="0">
-                <a:hlinkClick r:id="rId2"/>
-              </a:rPr>
-              <a:t>dev-portal.getpebble.com</a:t>
-            </a:r>
-            <a:endParaRPr lang="en-US" dirty="0" smtClean="0"/>
-          </a:p>
-          <a:p>
-            <a:r>
-              <a:rPr lang="en-US" dirty="0" smtClean="0"/>
-              <a:t>Cloud Pebble Development</a:t>
-            </a:r>
-          </a:p>
-          <a:p>
-            <a:pPr lvl="1"/>
-            <a:r>
-              <a:rPr lang="en-US" dirty="0" smtClean="0">
-                <a:hlinkClick r:id="rId3"/>
-              </a:rPr>
-              <a:t>Cloud Pebble Development</a:t>
-            </a:r>
-            <a:endParaRPr lang="en-US" dirty="0" smtClean="0"/>
-          </a:p>
-          <a:p>
-            <a:pPr lvl="1"/>
-            <a:r>
-              <a:rPr lang="en-US" dirty="0" smtClean="0"/>
-              <a:t>“ready” = JavaScript handler is ready</a:t>
-            </a:r>
-          </a:p>
-          <a:p>
-            <a:pPr lvl="1"/>
-            <a:r>
-              <a:rPr lang="en-US" dirty="0" smtClean="0"/>
-              <a:t>“</a:t>
-            </a:r>
-            <a:r>
-              <a:rPr lang="en-US" dirty="0" err="1" smtClean="0"/>
-              <a:t>appmessage</a:t>
-            </a:r>
-            <a:r>
-              <a:rPr lang="en-US" dirty="0" smtClean="0"/>
-              <a:t>” = when you have received a message from phone</a:t>
-            </a:r>
-          </a:p>
-          <a:p>
-            <a:pPr lvl="2"/>
-            <a:r>
-              <a:rPr lang="en-US" dirty="0" err="1" smtClean="0"/>
-              <a:t>Pebble.sendAppMessage</a:t>
-            </a:r>
-            <a:r>
-              <a:rPr lang="en-US" dirty="0" smtClean="0"/>
-              <a:t>(message) – to send to phone</a:t>
-            </a:r>
-          </a:p>
-          <a:p>
-            <a:pPr lvl="1"/>
-            <a:endParaRPr lang="en-US" dirty="0"/>
+            <a:pPr marL="285750" indent="-285750">
+              <a:buFont typeface="Wingdings" panose="05000000000000000000" pitchFamily="2" charset="2"/>
+              <a:buChar char="Ø"/>
+            </a:pPr>
+            <a:r>
+              <a:rPr lang="en-US" sz="2000" dirty="0" smtClean="0"/>
+              <a:t>What is New!!</a:t>
+            </a:r>
+          </a:p>
+          <a:p>
+            <a:pPr marL="742950" lvl="1" indent="-285750">
+              <a:buFont typeface="Wingdings" panose="05000000000000000000" pitchFamily="2" charset="2"/>
+              <a:buChar char="Ø"/>
+            </a:pPr>
+            <a:r>
+              <a:rPr lang="en-US" sz="2000" dirty="0" smtClean="0"/>
+              <a:t>Time line concept</a:t>
+            </a:r>
+          </a:p>
+          <a:p>
+            <a:pPr marL="1200150" lvl="2" indent="-285750">
+              <a:buFont typeface="Wingdings" panose="05000000000000000000" pitchFamily="2" charset="2"/>
+              <a:buChar char="Ø"/>
+            </a:pPr>
+            <a:r>
+              <a:rPr lang="en-US" sz="2000" dirty="0" smtClean="0"/>
+              <a:t>Pin it</a:t>
+            </a:r>
+          </a:p>
+          <a:p>
+            <a:pPr marL="742950" lvl="1" indent="-285750">
+              <a:buFont typeface="Wingdings" panose="05000000000000000000" pitchFamily="2" charset="2"/>
+              <a:buChar char="Ø"/>
+            </a:pPr>
+            <a:r>
+              <a:rPr lang="en-US" sz="2000" dirty="0" smtClean="0"/>
+              <a:t>Tokens</a:t>
+            </a:r>
+          </a:p>
+          <a:p>
+            <a:pPr marL="1200150" lvl="2" indent="-285750">
+              <a:buFont typeface="Wingdings" panose="05000000000000000000" pitchFamily="2" charset="2"/>
+              <a:buChar char="Ø"/>
+            </a:pPr>
+            <a:r>
+              <a:rPr lang="en-US" sz="2000" dirty="0" smtClean="0"/>
+              <a:t>User/Application unique</a:t>
+            </a:r>
+          </a:p>
+          <a:p>
+            <a:pPr marL="742950" lvl="1" indent="-285750">
+              <a:buFont typeface="Wingdings" panose="05000000000000000000" pitchFamily="2" charset="2"/>
+              <a:buChar char="Ø"/>
+            </a:pPr>
+            <a:r>
+              <a:rPr lang="en-US" sz="2000" dirty="0" smtClean="0"/>
+              <a:t>Notifications</a:t>
+            </a:r>
+          </a:p>
+          <a:p>
+            <a:pPr marL="1200150" lvl="2" indent="-285750">
+              <a:buFont typeface="Wingdings" panose="05000000000000000000" pitchFamily="2" charset="2"/>
+              <a:buChar char="Ø"/>
+            </a:pPr>
+            <a:r>
+              <a:rPr lang="en-US" sz="2000" dirty="0" smtClean="0"/>
+              <a:t>Token</a:t>
+            </a:r>
+          </a:p>
+          <a:p>
+            <a:pPr marL="1200150" lvl="2" indent="-285750">
+              <a:buFont typeface="Wingdings" panose="05000000000000000000" pitchFamily="2" charset="2"/>
+              <a:buChar char="Ø"/>
+            </a:pPr>
+            <a:r>
+              <a:rPr lang="en-US" sz="2000" dirty="0" smtClean="0"/>
+              <a:t>Topic</a:t>
+            </a:r>
+          </a:p>
+          <a:p>
+            <a:pPr marL="1200150" lvl="2" indent="-285750">
+              <a:buFont typeface="Wingdings" panose="05000000000000000000" pitchFamily="2" charset="2"/>
+              <a:buChar char="Ø"/>
+            </a:pPr>
+            <a:r>
+              <a:rPr lang="en-US" sz="2000" dirty="0" smtClean="0"/>
+              <a:t>All</a:t>
+            </a:r>
+            <a:endParaRPr lang="en-US" sz="2000" dirty="0"/>
           </a:p>
         </p:txBody>
       </p:sp>
     </p:spTree>
     <p:extLst>
       <p:ext uri="{BB962C8B-B14F-4D97-AF65-F5344CB8AC3E}">
-        <p14:creationId xmlns:p14="http://schemas.microsoft.com/office/powerpoint/2010/main" val="358192862"/>
+        <p14:creationId xmlns:p14="http://schemas.microsoft.com/office/powerpoint/2010/main" val="2526853437"/>
       </p:ext>
     </p:extLst>
   </p:cSld>
   <p:clrMapOvr>
     <a:masterClrMapping/>
   </p:clrMapOvr>
+  <p:timing>
+    <p:tnLst>
+      <p:par>
+        <p:cTn id="1" dur="indefinite" restart="never" nodeType="tmRoot"/>
+      </p:par>
+    </p:tnLst>
+  </p:timing>
 </p:sld>
 </file>
 

</xml_diff>